<commit_message>
update week 10 review powerpoint for virtual
</commit_message>
<xml_diff>
--- a/Week10/ReviewGame.pptx
+++ b/Week10/ReviewGame.pptx
@@ -229,7 +229,7 @@
           <a:p>
             <a:fld id="{19104133-B5B0-4351-8158-4F0E5EB1E2BF}" type="datetimeFigureOut">
               <a:rPr lang="en-US" smtClean="0"/>
-              <a:t>3/24/2020</a:t>
+              <a:t>4/17/2020</a:t>
             </a:fld>
             <a:endParaRPr lang="en-US"/>
           </a:p>
@@ -1902,6 +1902,15 @@
           <a:p>
             <a:r>
               <a:rPr lang="en-US" dirty="0" smtClean="0"/>
+              <a:t>HINT: Students should use bootstrap</a:t>
+            </a:r>
+          </a:p>
+          <a:p>
+            <a:endParaRPr lang="en-US" dirty="0" smtClean="0"/>
+          </a:p>
+          <a:p>
+            <a:r>
+              <a:rPr lang="en-US" dirty="0" smtClean="0"/>
               <a:t>&lt;div class=“row”&gt;</a:t>
             </a:r>
           </a:p>
@@ -2942,7 +2951,7 @@
             <a:fld id="{1C2D31DE-C454-491C-B5C3-F097855E3DF7}" type="datetime4">
               <a:rPr lang="en-US" smtClean="0"/>
               <a:pPr/>
-              <a:t>March 24, 2020</a:t>
+              <a:t>April 17, 2020</a:t>
             </a:fld>
             <a:endParaRPr lang="en-US" dirty="0"/>
           </a:p>
@@ -6342,7 +6351,7 @@
           <a:p>
             <a:fld id="{5958763E-B898-436D-883D-03711491D54A}" type="datetimeFigureOut">
               <a:rPr lang="en-US" smtClean="0"/>
-              <a:t>3/24/2020</a:t>
+              <a:t>4/17/2020</a:t>
             </a:fld>
             <a:endParaRPr lang="en-US"/>
           </a:p>
@@ -6543,7 +6552,7 @@
           <a:p>
             <a:fld id="{5958763E-B898-436D-883D-03711491D54A}" type="datetimeFigureOut">
               <a:rPr lang="en-US" smtClean="0"/>
-              <a:t>3/24/2020</a:t>
+              <a:t>4/17/2020</a:t>
             </a:fld>
             <a:endParaRPr lang="en-US"/>
           </a:p>
@@ -6800,7 +6809,7 @@
           <a:p>
             <a:fld id="{5958763E-B898-436D-883D-03711491D54A}" type="datetimeFigureOut">
               <a:rPr lang="en-US" smtClean="0"/>
-              <a:t>3/24/2020</a:t>
+              <a:t>4/17/2020</a:t>
             </a:fld>
             <a:endParaRPr lang="en-US"/>
           </a:p>
@@ -7155,7 +7164,7 @@
           <a:p>
             <a:fld id="{5958763E-B898-436D-883D-03711491D54A}" type="datetimeFigureOut">
               <a:rPr lang="en-US" smtClean="0"/>
-              <a:t>3/24/2020</a:t>
+              <a:t>4/17/2020</a:t>
             </a:fld>
             <a:endParaRPr lang="en-US"/>
           </a:p>
@@ -7578,7 +7587,7 @@
           <a:p>
             <a:fld id="{5958763E-B898-436D-883D-03711491D54A}" type="datetimeFigureOut">
               <a:rPr lang="en-US" smtClean="0"/>
-              <a:t>3/24/2020</a:t>
+              <a:t>4/17/2020</a:t>
             </a:fld>
             <a:endParaRPr lang="en-US"/>
           </a:p>
@@ -8086,7 +8095,7 @@
           <a:p>
             <a:fld id="{5958763E-B898-436D-883D-03711491D54A}" type="datetimeFigureOut">
               <a:rPr lang="en-US" smtClean="0"/>
-              <a:t>3/24/2020</a:t>
+              <a:t>4/17/2020</a:t>
             </a:fld>
             <a:endParaRPr lang="en-US"/>
           </a:p>
@@ -8544,7 +8553,7 @@
           <a:p>
             <a:fld id="{5958763E-B898-436D-883D-03711491D54A}" type="datetimeFigureOut">
               <a:rPr lang="en-US" smtClean="0"/>
-              <a:t>3/24/2020</a:t>
+              <a:t>4/17/2020</a:t>
             </a:fld>
             <a:endParaRPr lang="en-US"/>
           </a:p>
@@ -9162,7 +9171,7 @@
           <a:p>
             <a:fld id="{5958763E-B898-436D-883D-03711491D54A}" type="datetimeFigureOut">
               <a:rPr lang="en-US" smtClean="0"/>
-              <a:t>3/24/2020</a:t>
+              <a:t>4/17/2020</a:t>
             </a:fld>
             <a:endParaRPr lang="en-US"/>
           </a:p>
@@ -9940,7 +9949,7 @@
           <a:p>
             <a:fld id="{5958763E-B898-436D-883D-03711491D54A}" type="datetimeFigureOut">
               <a:rPr lang="en-US" smtClean="0"/>
-              <a:t>3/24/2020</a:t>
+              <a:t>4/17/2020</a:t>
             </a:fld>
             <a:endParaRPr lang="en-US"/>
           </a:p>
@@ -10051,7 +10060,7 @@
           <a:p>
             <a:fld id="{5958763E-B898-436D-883D-03711491D54A}" type="datetimeFigureOut">
               <a:rPr lang="en-US" smtClean="0"/>
-              <a:t>3/24/2020</a:t>
+              <a:t>4/17/2020</a:t>
             </a:fld>
             <a:endParaRPr lang="en-US"/>
           </a:p>
@@ -10393,7 +10402,7 @@
             <a:fld id="{1C2D31DE-C454-491C-B5C3-F097855E3DF7}" type="datetime4">
               <a:rPr lang="en-US" smtClean="0"/>
               <a:pPr/>
-              <a:t>March 24, 2020</a:t>
+              <a:t>April 17, 2020</a:t>
             </a:fld>
             <a:endParaRPr lang="en-US" dirty="0"/>
           </a:p>
@@ -13553,7 +13562,7 @@
           <a:p>
             <a:fld id="{5958763E-B898-436D-883D-03711491D54A}" type="datetimeFigureOut">
               <a:rPr lang="en-US" smtClean="0"/>
-              <a:t>3/24/2020</a:t>
+              <a:t>4/17/2020</a:t>
             </a:fld>
             <a:endParaRPr lang="en-US"/>
           </a:p>
@@ -13684,7 +13693,7 @@
           <a:p>
             <a:fld id="{5958763E-B898-436D-883D-03711491D54A}" type="datetimeFigureOut">
               <a:rPr lang="en-US" smtClean="0"/>
-              <a:t>3/24/2020</a:t>
+              <a:t>4/17/2020</a:t>
             </a:fld>
             <a:endParaRPr lang="en-US"/>
           </a:p>
@@ -13815,7 +13824,7 @@
           <a:p>
             <a:fld id="{5958763E-B898-436D-883D-03711491D54A}" type="datetimeFigureOut">
               <a:rPr lang="en-US" smtClean="0"/>
-              <a:t>3/24/2020</a:t>
+              <a:t>4/17/2020</a:t>
             </a:fld>
             <a:endParaRPr lang="en-US"/>
           </a:p>
@@ -13946,7 +13955,7 @@
           <a:p>
             <a:fld id="{5958763E-B898-436D-883D-03711491D54A}" type="datetimeFigureOut">
               <a:rPr lang="en-US" smtClean="0"/>
-              <a:t>3/24/2020</a:t>
+              <a:t>4/17/2020</a:t>
             </a:fld>
             <a:endParaRPr lang="en-US"/>
           </a:p>
@@ -14077,7 +14086,7 @@
           <a:p>
             <a:fld id="{5958763E-B898-436D-883D-03711491D54A}" type="datetimeFigureOut">
               <a:rPr lang="en-US" smtClean="0"/>
-              <a:t>3/24/2020</a:t>
+              <a:t>4/17/2020</a:t>
             </a:fld>
             <a:endParaRPr lang="en-US"/>
           </a:p>
@@ -14208,7 +14217,7 @@
           <a:p>
             <a:fld id="{5958763E-B898-436D-883D-03711491D54A}" type="datetimeFigureOut">
               <a:rPr lang="en-US" smtClean="0"/>
-              <a:t>3/24/2020</a:t>
+              <a:t>4/17/2020</a:t>
             </a:fld>
             <a:endParaRPr lang="en-US"/>
           </a:p>
@@ -14339,7 +14348,7 @@
           <a:p>
             <a:fld id="{5958763E-B898-436D-883D-03711491D54A}" type="datetimeFigureOut">
               <a:rPr lang="en-US" smtClean="0"/>
-              <a:t>3/24/2020</a:t>
+              <a:t>4/17/2020</a:t>
             </a:fld>
             <a:endParaRPr lang="en-US"/>
           </a:p>
@@ -14470,7 +14479,7 @@
           <a:p>
             <a:fld id="{5958763E-B898-436D-883D-03711491D54A}" type="datetimeFigureOut">
               <a:rPr lang="en-US" smtClean="0"/>
-              <a:t>3/24/2020</a:t>
+              <a:t>4/17/2020</a:t>
             </a:fld>
             <a:endParaRPr lang="en-US"/>
           </a:p>
@@ -14610,7 +14619,7 @@
           <a:p>
             <a:fld id="{5958763E-B898-436D-883D-03711491D54A}" type="datetimeFigureOut">
               <a:rPr lang="en-US" smtClean="0"/>
-              <a:t>3/24/2020</a:t>
+              <a:t>4/17/2020</a:t>
             </a:fld>
             <a:endParaRPr lang="en-US"/>
           </a:p>
@@ -17971,7 +17980,7 @@
             <a:fld id="{1C2D31DE-C454-491C-B5C3-F097855E3DF7}" type="datetime4">
               <a:rPr lang="en-US" smtClean="0"/>
               <a:pPr/>
-              <a:t>March 24, 2020</a:t>
+              <a:t>April 17, 2020</a:t>
             </a:fld>
             <a:endParaRPr lang="en-US" dirty="0"/>
           </a:p>
@@ -30216,7 +30225,7 @@
           <a:p>
             <a:fld id="{5958763E-B898-436D-883D-03711491D54A}" type="datetimeFigureOut">
               <a:rPr lang="en-US" smtClean="0"/>
-              <a:t>3/24/2020</a:t>
+              <a:t>4/17/2020</a:t>
             </a:fld>
             <a:endParaRPr lang="en-US"/>
           </a:p>
@@ -30625,7 +30634,7 @@
           <a:p>
             <a:fld id="{5958763E-B898-436D-883D-03711491D54A}" type="datetimeFigureOut">
               <a:rPr lang="en-US" smtClean="0"/>
-              <a:t>3/24/2020</a:t>
+              <a:t>4/17/2020</a:t>
             </a:fld>
             <a:endParaRPr lang="en-US"/>
           </a:p>
@@ -30926,7 +30935,7 @@
           <a:p>
             <a:fld id="{5958763E-B898-436D-883D-03711491D54A}" type="datetimeFigureOut">
               <a:rPr lang="en-US" smtClean="0"/>
-              <a:t>3/24/2020</a:t>
+              <a:t>4/17/2020</a:t>
             </a:fld>
             <a:endParaRPr lang="en-US"/>
           </a:p>
@@ -31134,7 +31143,7 @@
           <a:p>
             <a:fld id="{5958763E-B898-436D-883D-03711491D54A}" type="datetimeFigureOut">
               <a:rPr lang="en-US" smtClean="0"/>
-              <a:t>3/24/2020</a:t>
+              <a:t>4/17/2020</a:t>
             </a:fld>
             <a:endParaRPr lang="en-US"/>
           </a:p>
@@ -31402,7 +31411,7 @@
           <a:p>
             <a:fld id="{5958763E-B898-436D-883D-03711491D54A}" type="datetimeFigureOut">
               <a:rPr lang="en-US" smtClean="0"/>
-              <a:t>3/24/2020</a:t>
+              <a:t>4/17/2020</a:t>
             </a:fld>
             <a:endParaRPr lang="en-US"/>
           </a:p>
@@ -31919,7 +31928,7 @@
           <a:p>
             <a:fld id="{5958763E-B898-436D-883D-03711491D54A}" type="datetimeFigureOut">
               <a:rPr lang="en-US" smtClean="0"/>
-              <a:t>3/24/2020</a:t>
+              <a:t>4/17/2020</a:t>
             </a:fld>
             <a:endParaRPr lang="en-US"/>
           </a:p>
@@ -32407,7 +32416,7 @@
           <a:p>
             <a:fld id="{5958763E-B898-436D-883D-03711491D54A}" type="datetimeFigureOut">
               <a:rPr lang="en-US" smtClean="0"/>
-              <a:t>3/24/2020</a:t>
+              <a:t>4/17/2020</a:t>
             </a:fld>
             <a:endParaRPr lang="en-US"/>
           </a:p>
@@ -33233,7 +33242,7 @@
           <a:p>
             <a:fld id="{5958763E-B898-436D-883D-03711491D54A}" type="datetimeFigureOut">
               <a:rPr lang="en-US" smtClean="0"/>
-              <a:t>3/24/2020</a:t>
+              <a:t>4/17/2020</a:t>
             </a:fld>
             <a:endParaRPr lang="en-US"/>
           </a:p>
@@ -33441,7 +33450,7 @@
           <a:p>
             <a:fld id="{5958763E-B898-436D-883D-03711491D54A}" type="datetimeFigureOut">
               <a:rPr lang="en-US" smtClean="0"/>
-              <a:t>3/24/2020</a:t>
+              <a:t>4/17/2020</a:t>
             </a:fld>
             <a:endParaRPr lang="en-US"/>
           </a:p>
@@ -33783,7 +33792,7 @@
           <a:p>
             <a:fld id="{5958763E-B898-436D-883D-03711491D54A}" type="datetimeFigureOut">
               <a:rPr lang="en-US" smtClean="0"/>
-              <a:t>3/24/2020</a:t>
+              <a:t>4/17/2020</a:t>
             </a:fld>
             <a:endParaRPr lang="en-US"/>
           </a:p>
@@ -34020,7 +34029,7 @@
           <a:p>
             <a:fld id="{5958763E-B898-436D-883D-03711491D54A}" type="datetimeFigureOut">
               <a:rPr lang="en-US" smtClean="0"/>
-              <a:t>3/24/2020</a:t>
+              <a:t>4/17/2020</a:t>
             </a:fld>
             <a:endParaRPr lang="en-US"/>
           </a:p>
@@ -34271,7 +34280,7 @@
           <a:p>
             <a:fld id="{5958763E-B898-436D-883D-03711491D54A}" type="datetimeFigureOut">
               <a:rPr lang="en-US" smtClean="0"/>
-              <a:t>3/24/2020</a:t>
+              <a:t>4/17/2020</a:t>
             </a:fld>
             <a:endParaRPr lang="en-US"/>
           </a:p>
@@ -37860,14 +37869,11 @@
             <p:ph type="title"/>
           </p:nvPr>
         </p:nvSpPr>
-        <p:spPr>
-          <a:xfrm>
-            <a:off x="609600" y="2076322"/>
-            <a:ext cx="10972800" cy="2705356"/>
-          </a:xfrm>
-        </p:spPr>
+        <p:spPr/>
         <p:txBody>
-          <a:bodyPr/>
+          <a:bodyPr>
+            <a:normAutofit fontScale="90000"/>
+          </a:bodyPr>
           <a:lstStyle/>
           <a:p>
             <a:r>
@@ -37886,8 +37892,7 @@
               <a:rPr lang="en-US" cap="none" dirty="0" smtClean="0">
                 <a:solidFill>
                   <a:schemeClr val="accent1">
-                    <a:lumMod val="40000"/>
-                    <a:lumOff val="60000"/>
+                    <a:lumMod val="50000"/>
                   </a:schemeClr>
                 </a:solidFill>
               </a:rPr>
@@ -37909,6 +37914,41 @@
           </a:p>
         </p:txBody>
       </p:sp>
+      <p:cxnSp>
+        <p:nvCxnSpPr>
+          <p:cNvPr id="4" name="Straight Connector 3"/>
+          <p:cNvCxnSpPr/>
+          <p:nvPr/>
+        </p:nvCxnSpPr>
+        <p:spPr>
+          <a:xfrm>
+            <a:off x="6096000" y="1028700"/>
+            <a:ext cx="0" cy="5829300"/>
+          </a:xfrm>
+          <a:prstGeom prst="line">
+            <a:avLst/>
+          </a:prstGeom>
+          <a:ln w="139700">
+            <a:miter lim="800000"/>
+            <a:headEnd type="none"/>
+            <a:tailEnd type="none"/>
+          </a:ln>
+        </p:spPr>
+        <p:style>
+          <a:lnRef idx="1">
+            <a:schemeClr val="dk1"/>
+          </a:lnRef>
+          <a:fillRef idx="0">
+            <a:schemeClr val="dk1"/>
+          </a:fillRef>
+          <a:effectRef idx="0">
+            <a:schemeClr val="dk1"/>
+          </a:effectRef>
+          <a:fontRef idx="minor">
+            <a:schemeClr val="tx1"/>
+          </a:fontRef>
+        </p:style>
+      </p:cxnSp>
     </p:spTree>
     <p:extLst>
       <p:ext uri="{BB962C8B-B14F-4D97-AF65-F5344CB8AC3E}">
@@ -37952,14 +37992,11 @@
             <p:ph type="title"/>
           </p:nvPr>
         </p:nvSpPr>
-        <p:spPr>
-          <a:xfrm>
-            <a:off x="609600" y="2741120"/>
-            <a:ext cx="10972800" cy="1375761"/>
-          </a:xfrm>
-        </p:spPr>
+        <p:spPr/>
         <p:txBody>
-          <a:bodyPr/>
+          <a:bodyPr>
+            <a:normAutofit fontScale="90000"/>
+          </a:bodyPr>
           <a:lstStyle/>
           <a:p>
             <a:r>
@@ -37982,6 +38019,41 @@
           </a:p>
         </p:txBody>
       </p:sp>
+      <p:cxnSp>
+        <p:nvCxnSpPr>
+          <p:cNvPr id="4" name="Straight Connector 3"/>
+          <p:cNvCxnSpPr/>
+          <p:nvPr/>
+        </p:nvCxnSpPr>
+        <p:spPr>
+          <a:xfrm>
+            <a:off x="6096000" y="1028700"/>
+            <a:ext cx="0" cy="5829300"/>
+          </a:xfrm>
+          <a:prstGeom prst="line">
+            <a:avLst/>
+          </a:prstGeom>
+          <a:ln w="139700">
+            <a:miter lim="800000"/>
+            <a:headEnd type="none"/>
+            <a:tailEnd type="none"/>
+          </a:ln>
+        </p:spPr>
+        <p:style>
+          <a:lnRef idx="1">
+            <a:schemeClr val="dk1"/>
+          </a:lnRef>
+          <a:fillRef idx="0">
+            <a:schemeClr val="dk1"/>
+          </a:fillRef>
+          <a:effectRef idx="0">
+            <a:schemeClr val="dk1"/>
+          </a:effectRef>
+          <a:fontRef idx="minor">
+            <a:schemeClr val="tx1"/>
+          </a:fontRef>
+        </p:style>
+      </p:cxnSp>
     </p:spTree>
     <p:extLst>
       <p:ext uri="{BB962C8B-B14F-4D97-AF65-F5344CB8AC3E}">
@@ -38027,44 +38099,82 @@
         </p:nvSpPr>
         <p:spPr/>
         <p:txBody>
-          <a:bodyPr/>
+          <a:bodyPr>
+            <a:normAutofit fontScale="90000"/>
+          </a:bodyPr>
           <a:lstStyle/>
           <a:p>
             <a:r>
+              <a:rPr lang="en-US" dirty="0" smtClean="0">
+                <a:solidFill>
+                  <a:schemeClr val="accent2"/>
+                </a:solidFill>
+              </a:rPr>
+              <a:t>Team </a:t>
+            </a:r>
+            <a:r>
+              <a:rPr lang="en-US" dirty="0" smtClean="0">
+                <a:solidFill>
+                  <a:schemeClr val="accent2"/>
+                </a:solidFill>
+              </a:rPr>
+              <a:t>Challenge</a:t>
+            </a:r>
+            <a:r>
               <a:rPr lang="en-US" dirty="0" smtClean="0"/>
-              <a:t>Team Challenge</a:t>
+              <a:t>: </a:t>
+            </a:r>
+            <a:r>
+              <a:rPr lang="en-US" dirty="0" smtClean="0"/>
+              <a:t>Create </a:t>
+            </a:r>
+            <a:r>
+              <a:rPr lang="en-US" dirty="0"/>
+              <a:t>an HTML dropdown containing three options: "S", "M", "L</a:t>
+            </a:r>
+            <a:r>
+              <a:rPr lang="en-US" dirty="0" smtClean="0"/>
+              <a:t>"</a:t>
             </a:r>
             <a:endParaRPr lang="en-US" dirty="0"/>
           </a:p>
         </p:txBody>
       </p:sp>
-      <p:sp>
-        <p:nvSpPr>
-          <p:cNvPr id="3" name="Content Placeholder 2"/>
-          <p:cNvSpPr>
-            <a:spLocks noGrp="1"/>
-          </p:cNvSpPr>
-          <p:nvPr>
-            <p:ph idx="1"/>
-          </p:nvPr>
-        </p:nvSpPr>
-        <p:spPr/>
-        <p:txBody>
-          <a:bodyPr anchor="ctr">
-            <a:normAutofit/>
-          </a:bodyPr>
-          <a:lstStyle/>
-          <a:p>
-            <a:pPr marL="0" indent="0" algn="ctr">
-              <a:buNone/>
-            </a:pPr>
-            <a:r>
-              <a:rPr lang="en-US" sz="5400" dirty="0"/>
-              <a:t>Create an HTML dropdown containing three options: "S", "M", "L"</a:t>
-            </a:r>
-          </a:p>
-        </p:txBody>
-      </p:sp>
+      <p:cxnSp>
+        <p:nvCxnSpPr>
+          <p:cNvPr id="6" name="Straight Connector 5"/>
+          <p:cNvCxnSpPr/>
+          <p:nvPr/>
+        </p:nvCxnSpPr>
+        <p:spPr>
+          <a:xfrm>
+            <a:off x="6096000" y="1028700"/>
+            <a:ext cx="0" cy="5829300"/>
+          </a:xfrm>
+          <a:prstGeom prst="line">
+            <a:avLst/>
+          </a:prstGeom>
+          <a:ln w="139700">
+            <a:miter lim="800000"/>
+            <a:headEnd type="none"/>
+            <a:tailEnd type="none"/>
+          </a:ln>
+        </p:spPr>
+        <p:style>
+          <a:lnRef idx="1">
+            <a:schemeClr val="dk1"/>
+          </a:lnRef>
+          <a:fillRef idx="0">
+            <a:schemeClr val="dk1"/>
+          </a:fillRef>
+          <a:effectRef idx="0">
+            <a:schemeClr val="dk1"/>
+          </a:effectRef>
+          <a:fontRef idx="minor">
+            <a:schemeClr val="tx1"/>
+          </a:fontRef>
+        </p:style>
+      </p:cxnSp>
     </p:spTree>
     <p:extLst>
       <p:ext uri="{BB962C8B-B14F-4D97-AF65-F5344CB8AC3E}">
@@ -38108,14 +38218,11 @@
             <p:ph type="title"/>
           </p:nvPr>
         </p:nvSpPr>
-        <p:spPr>
-          <a:xfrm>
-            <a:off x="609600" y="2741120"/>
-            <a:ext cx="10972800" cy="1375761"/>
-          </a:xfrm>
-        </p:spPr>
+        <p:spPr/>
         <p:txBody>
-          <a:bodyPr/>
+          <a:bodyPr>
+            <a:normAutofit fontScale="90000"/>
+          </a:bodyPr>
           <a:lstStyle/>
           <a:p>
             <a:r>
@@ -38126,6 +38233,41 @@
           </a:p>
         </p:txBody>
       </p:sp>
+      <p:cxnSp>
+        <p:nvCxnSpPr>
+          <p:cNvPr id="4" name="Straight Connector 3"/>
+          <p:cNvCxnSpPr/>
+          <p:nvPr/>
+        </p:nvCxnSpPr>
+        <p:spPr>
+          <a:xfrm>
+            <a:off x="6096000" y="1028700"/>
+            <a:ext cx="0" cy="5829300"/>
+          </a:xfrm>
+          <a:prstGeom prst="line">
+            <a:avLst/>
+          </a:prstGeom>
+          <a:ln w="139700">
+            <a:miter lim="800000"/>
+            <a:headEnd type="none"/>
+            <a:tailEnd type="none"/>
+          </a:ln>
+        </p:spPr>
+        <p:style>
+          <a:lnRef idx="1">
+            <a:schemeClr val="dk1"/>
+          </a:lnRef>
+          <a:fillRef idx="0">
+            <a:schemeClr val="dk1"/>
+          </a:fillRef>
+          <a:effectRef idx="0">
+            <a:schemeClr val="dk1"/>
+          </a:effectRef>
+          <a:fontRef idx="minor">
+            <a:schemeClr val="tx1"/>
+          </a:fontRef>
+        </p:style>
+      </p:cxnSp>
     </p:spTree>
     <p:extLst>
       <p:ext uri="{BB962C8B-B14F-4D97-AF65-F5344CB8AC3E}">
@@ -38169,14 +38311,11 @@
             <p:ph type="title"/>
           </p:nvPr>
         </p:nvSpPr>
-        <p:spPr>
-          <a:xfrm>
-            <a:off x="609600" y="2408720"/>
-            <a:ext cx="10972800" cy="2040559"/>
-          </a:xfrm>
-        </p:spPr>
+        <p:spPr/>
         <p:txBody>
-          <a:bodyPr/>
+          <a:bodyPr>
+            <a:normAutofit fontScale="90000"/>
+          </a:bodyPr>
           <a:lstStyle/>
           <a:p>
             <a:r>
@@ -38191,6 +38330,41 @@
           </a:p>
         </p:txBody>
       </p:sp>
+      <p:cxnSp>
+        <p:nvCxnSpPr>
+          <p:cNvPr id="4" name="Straight Connector 3"/>
+          <p:cNvCxnSpPr/>
+          <p:nvPr/>
+        </p:nvCxnSpPr>
+        <p:spPr>
+          <a:xfrm>
+            <a:off x="6096000" y="1028700"/>
+            <a:ext cx="0" cy="5829300"/>
+          </a:xfrm>
+          <a:prstGeom prst="line">
+            <a:avLst/>
+          </a:prstGeom>
+          <a:ln w="139700">
+            <a:miter lim="800000"/>
+            <a:headEnd type="none"/>
+            <a:tailEnd type="none"/>
+          </a:ln>
+        </p:spPr>
+        <p:style>
+          <a:lnRef idx="1">
+            <a:schemeClr val="dk1"/>
+          </a:lnRef>
+          <a:fillRef idx="0">
+            <a:schemeClr val="dk1"/>
+          </a:fillRef>
+          <a:effectRef idx="0">
+            <a:schemeClr val="dk1"/>
+          </a:effectRef>
+          <a:fontRef idx="minor">
+            <a:schemeClr val="tx1"/>
+          </a:fontRef>
+        </p:style>
+      </p:cxnSp>
     </p:spTree>
     <p:extLst>
       <p:ext uri="{BB962C8B-B14F-4D97-AF65-F5344CB8AC3E}">
@@ -38234,14 +38408,11 @@
             <p:ph type="title"/>
           </p:nvPr>
         </p:nvSpPr>
-        <p:spPr>
-          <a:xfrm>
-            <a:off x="609600" y="2741119"/>
-            <a:ext cx="10972800" cy="1375761"/>
-          </a:xfrm>
-        </p:spPr>
+        <p:spPr/>
         <p:txBody>
-          <a:bodyPr/>
+          <a:bodyPr>
+            <a:normAutofit fontScale="90000"/>
+          </a:bodyPr>
           <a:lstStyle/>
           <a:p>
             <a:r>
@@ -38249,9 +38420,11 @@
               <a:t>Create a CSS ruleset to style an element with an </a:t>
             </a:r>
             <a:r>
-              <a:rPr lang="en-US" cap="none" dirty="0" smtClean="0">
+              <a:rPr lang="en-US" sz="3600" cap="none" dirty="0" smtClean="0">
                 <a:solidFill>
-                  <a:schemeClr val="accent1"/>
+                  <a:schemeClr val="accent1">
+                    <a:lumMod val="50000"/>
+                  </a:schemeClr>
                 </a:solidFill>
                 <a:latin typeface="Consolas" panose="020B0609020204030204" pitchFamily="49" charset="0"/>
               </a:rPr>
@@ -38273,6 +38446,41 @@
           </a:p>
         </p:txBody>
       </p:sp>
+      <p:cxnSp>
+        <p:nvCxnSpPr>
+          <p:cNvPr id="4" name="Straight Connector 3"/>
+          <p:cNvCxnSpPr/>
+          <p:nvPr/>
+        </p:nvCxnSpPr>
+        <p:spPr>
+          <a:xfrm>
+            <a:off x="6096000" y="1028700"/>
+            <a:ext cx="0" cy="5829300"/>
+          </a:xfrm>
+          <a:prstGeom prst="line">
+            <a:avLst/>
+          </a:prstGeom>
+          <a:ln w="139700">
+            <a:miter lim="800000"/>
+            <a:headEnd type="none"/>
+            <a:tailEnd type="none"/>
+          </a:ln>
+        </p:spPr>
+        <p:style>
+          <a:lnRef idx="1">
+            <a:schemeClr val="dk1"/>
+          </a:lnRef>
+          <a:fillRef idx="0">
+            <a:schemeClr val="dk1"/>
+          </a:fillRef>
+          <a:effectRef idx="0">
+            <a:schemeClr val="dk1"/>
+          </a:effectRef>
+          <a:fontRef idx="minor">
+            <a:schemeClr val="tx1"/>
+          </a:fontRef>
+        </p:style>
+      </p:cxnSp>
     </p:spTree>
     <p:extLst>
       <p:ext uri="{BB962C8B-B14F-4D97-AF65-F5344CB8AC3E}">
@@ -38316,14 +38524,11 @@
             <p:ph type="title"/>
           </p:nvPr>
         </p:nvSpPr>
-        <p:spPr>
-          <a:xfrm>
-            <a:off x="609600" y="2325621"/>
-            <a:ext cx="10972800" cy="2206758"/>
-          </a:xfrm>
-        </p:spPr>
+        <p:spPr/>
         <p:txBody>
-          <a:bodyPr/>
+          <a:bodyPr>
+            <a:normAutofit fontScale="90000"/>
+          </a:bodyPr>
           <a:lstStyle/>
           <a:p>
             <a:r>
@@ -38331,11 +38536,10 @@
               <a:t>Which HTML attribute determines how an </a:t>
             </a:r>
             <a:r>
-              <a:rPr lang="en-US" sz="6000" cap="none" dirty="0" smtClean="0">
+              <a:rPr lang="en-US" sz="4000" cap="none" dirty="0" smtClean="0">
                 <a:solidFill>
                   <a:schemeClr val="accent1">
-                    <a:lumMod val="40000"/>
-                    <a:lumOff val="60000"/>
+                    <a:lumMod val="50000"/>
                   </a:schemeClr>
                 </a:solidFill>
                 <a:latin typeface="Consolas" panose="020B0609020204030204" pitchFamily="49" charset="0"/>
@@ -38358,6 +38562,41 @@
           </a:p>
         </p:txBody>
       </p:sp>
+      <p:cxnSp>
+        <p:nvCxnSpPr>
+          <p:cNvPr id="4" name="Straight Connector 3"/>
+          <p:cNvCxnSpPr/>
+          <p:nvPr/>
+        </p:nvCxnSpPr>
+        <p:spPr>
+          <a:xfrm>
+            <a:off x="6096000" y="1028700"/>
+            <a:ext cx="0" cy="5829300"/>
+          </a:xfrm>
+          <a:prstGeom prst="line">
+            <a:avLst/>
+          </a:prstGeom>
+          <a:ln w="139700">
+            <a:miter lim="800000"/>
+            <a:headEnd type="none"/>
+            <a:tailEnd type="none"/>
+          </a:ln>
+        </p:spPr>
+        <p:style>
+          <a:lnRef idx="1">
+            <a:schemeClr val="dk1"/>
+          </a:lnRef>
+          <a:fillRef idx="0">
+            <a:schemeClr val="dk1"/>
+          </a:fillRef>
+          <a:effectRef idx="0">
+            <a:schemeClr val="dk1"/>
+          </a:effectRef>
+          <a:fontRef idx="minor">
+            <a:schemeClr val="tx1"/>
+          </a:fontRef>
+        </p:style>
+      </p:cxnSp>
     </p:spTree>
     <p:extLst>
       <p:ext uri="{BB962C8B-B14F-4D97-AF65-F5344CB8AC3E}">
@@ -38401,14 +38640,11 @@
             <p:ph type="title"/>
           </p:nvPr>
         </p:nvSpPr>
-        <p:spPr>
-          <a:xfrm>
-            <a:off x="609600" y="2408720"/>
-            <a:ext cx="10972800" cy="2040559"/>
-          </a:xfrm>
-        </p:spPr>
+        <p:spPr/>
         <p:txBody>
-          <a:bodyPr/>
+          <a:bodyPr>
+            <a:normAutofit fontScale="90000"/>
+          </a:bodyPr>
           <a:lstStyle/>
           <a:p>
             <a:r>
@@ -38423,6 +38659,41 @@
           </a:p>
         </p:txBody>
       </p:sp>
+      <p:cxnSp>
+        <p:nvCxnSpPr>
+          <p:cNvPr id="4" name="Straight Connector 3"/>
+          <p:cNvCxnSpPr/>
+          <p:nvPr/>
+        </p:nvCxnSpPr>
+        <p:spPr>
+          <a:xfrm>
+            <a:off x="6096000" y="1028700"/>
+            <a:ext cx="0" cy="5829300"/>
+          </a:xfrm>
+          <a:prstGeom prst="line">
+            <a:avLst/>
+          </a:prstGeom>
+          <a:ln w="139700">
+            <a:miter lim="800000"/>
+            <a:headEnd type="none"/>
+            <a:tailEnd type="none"/>
+          </a:ln>
+        </p:spPr>
+        <p:style>
+          <a:lnRef idx="1">
+            <a:schemeClr val="dk1"/>
+          </a:lnRef>
+          <a:fillRef idx="0">
+            <a:schemeClr val="dk1"/>
+          </a:fillRef>
+          <a:effectRef idx="0">
+            <a:schemeClr val="dk1"/>
+          </a:effectRef>
+          <a:fontRef idx="minor">
+            <a:schemeClr val="tx1"/>
+          </a:fontRef>
+        </p:style>
+      </p:cxnSp>
     </p:spTree>
     <p:extLst>
       <p:ext uri="{BB962C8B-B14F-4D97-AF65-F5344CB8AC3E}">
@@ -38466,12 +38737,7 @@
             <p:ph type="title"/>
           </p:nvPr>
         </p:nvSpPr>
-        <p:spPr>
-          <a:xfrm>
-            <a:off x="609600" y="3073518"/>
-            <a:ext cx="10972800" cy="710964"/>
-          </a:xfrm>
-        </p:spPr>
+        <p:spPr/>
         <p:txBody>
           <a:bodyPr/>
           <a:lstStyle/>
@@ -38488,6 +38754,41 @@
           </a:p>
         </p:txBody>
       </p:sp>
+      <p:cxnSp>
+        <p:nvCxnSpPr>
+          <p:cNvPr id="4" name="Straight Connector 3"/>
+          <p:cNvCxnSpPr/>
+          <p:nvPr/>
+        </p:nvCxnSpPr>
+        <p:spPr>
+          <a:xfrm>
+            <a:off x="6096000" y="1028700"/>
+            <a:ext cx="0" cy="5829300"/>
+          </a:xfrm>
+          <a:prstGeom prst="line">
+            <a:avLst/>
+          </a:prstGeom>
+          <a:ln w="139700">
+            <a:miter lim="800000"/>
+            <a:headEnd type="none"/>
+            <a:tailEnd type="none"/>
+          </a:ln>
+        </p:spPr>
+        <p:style>
+          <a:lnRef idx="1">
+            <a:schemeClr val="dk1"/>
+          </a:lnRef>
+          <a:fillRef idx="0">
+            <a:schemeClr val="dk1"/>
+          </a:fillRef>
+          <a:effectRef idx="0">
+            <a:schemeClr val="dk1"/>
+          </a:effectRef>
+          <a:fontRef idx="minor">
+            <a:schemeClr val="tx1"/>
+          </a:fontRef>
+        </p:style>
+      </p:cxnSp>
     </p:spTree>
     <p:extLst>
       <p:ext uri="{BB962C8B-B14F-4D97-AF65-F5344CB8AC3E}">
@@ -38531,14 +38832,11 @@
             <p:ph type="title"/>
           </p:nvPr>
         </p:nvSpPr>
-        <p:spPr>
-          <a:xfrm>
-            <a:off x="609600" y="2741120"/>
-            <a:ext cx="10972800" cy="1375761"/>
-          </a:xfrm>
-        </p:spPr>
+        <p:spPr/>
         <p:txBody>
-          <a:bodyPr/>
+          <a:bodyPr>
+            <a:normAutofit fontScale="90000"/>
+          </a:bodyPr>
           <a:lstStyle/>
           <a:p>
             <a:r>
@@ -38553,6 +38851,41 @@
           </a:p>
         </p:txBody>
       </p:sp>
+      <p:cxnSp>
+        <p:nvCxnSpPr>
+          <p:cNvPr id="4" name="Straight Connector 3"/>
+          <p:cNvCxnSpPr/>
+          <p:nvPr/>
+        </p:nvCxnSpPr>
+        <p:spPr>
+          <a:xfrm>
+            <a:off x="6096000" y="1028700"/>
+            <a:ext cx="0" cy="5829300"/>
+          </a:xfrm>
+          <a:prstGeom prst="line">
+            <a:avLst/>
+          </a:prstGeom>
+          <a:ln w="139700">
+            <a:miter lim="800000"/>
+            <a:headEnd type="none"/>
+            <a:tailEnd type="none"/>
+          </a:ln>
+        </p:spPr>
+        <p:style>
+          <a:lnRef idx="1">
+            <a:schemeClr val="dk1"/>
+          </a:lnRef>
+          <a:fillRef idx="0">
+            <a:schemeClr val="dk1"/>
+          </a:fillRef>
+          <a:effectRef idx="0">
+            <a:schemeClr val="dk1"/>
+          </a:effectRef>
+          <a:fontRef idx="minor">
+            <a:schemeClr val="tx1"/>
+          </a:fontRef>
+        </p:style>
+      </p:cxnSp>
     </p:spTree>
     <p:extLst>
       <p:ext uri="{BB962C8B-B14F-4D97-AF65-F5344CB8AC3E}">
@@ -38596,14 +38929,11 @@
             <p:ph type="title"/>
           </p:nvPr>
         </p:nvSpPr>
-        <p:spPr>
-          <a:xfrm>
-            <a:off x="609600" y="2741120"/>
-            <a:ext cx="10972800" cy="1375761"/>
-          </a:xfrm>
-        </p:spPr>
+        <p:spPr/>
         <p:txBody>
-          <a:bodyPr/>
+          <a:bodyPr>
+            <a:normAutofit fontScale="90000"/>
+          </a:bodyPr>
           <a:lstStyle/>
           <a:p>
             <a:r>
@@ -38614,6 +38944,41 @@
           </a:p>
         </p:txBody>
       </p:sp>
+      <p:cxnSp>
+        <p:nvCxnSpPr>
+          <p:cNvPr id="5" name="Straight Connector 4"/>
+          <p:cNvCxnSpPr/>
+          <p:nvPr/>
+        </p:nvCxnSpPr>
+        <p:spPr>
+          <a:xfrm>
+            <a:off x="6096000" y="1028700"/>
+            <a:ext cx="0" cy="5829300"/>
+          </a:xfrm>
+          <a:prstGeom prst="line">
+            <a:avLst/>
+          </a:prstGeom>
+          <a:ln w="139700">
+            <a:miter lim="800000"/>
+            <a:headEnd type="none"/>
+            <a:tailEnd type="none"/>
+          </a:ln>
+        </p:spPr>
+        <p:style>
+          <a:lnRef idx="1">
+            <a:schemeClr val="dk1"/>
+          </a:lnRef>
+          <a:fillRef idx="0">
+            <a:schemeClr val="dk1"/>
+          </a:fillRef>
+          <a:effectRef idx="0">
+            <a:schemeClr val="dk1"/>
+          </a:effectRef>
+          <a:fontRef idx="minor">
+            <a:schemeClr val="tx1"/>
+          </a:fontRef>
+        </p:style>
+      </p:cxnSp>
     </p:spTree>
     <p:extLst>
       <p:ext uri="{BB962C8B-B14F-4D97-AF65-F5344CB8AC3E}">
@@ -38657,14 +39022,11 @@
             <p:ph type="title"/>
           </p:nvPr>
         </p:nvSpPr>
-        <p:spPr>
-          <a:xfrm>
-            <a:off x="609600" y="2408721"/>
-            <a:ext cx="10972800" cy="2040559"/>
-          </a:xfrm>
-        </p:spPr>
+        <p:spPr/>
         <p:txBody>
-          <a:bodyPr/>
+          <a:bodyPr>
+            <a:normAutofit fontScale="90000"/>
+          </a:bodyPr>
           <a:lstStyle/>
           <a:p>
             <a:r>
@@ -38695,6 +39057,41 @@
           </a:p>
         </p:txBody>
       </p:sp>
+      <p:cxnSp>
+        <p:nvCxnSpPr>
+          <p:cNvPr id="4" name="Straight Connector 3"/>
+          <p:cNvCxnSpPr/>
+          <p:nvPr/>
+        </p:nvCxnSpPr>
+        <p:spPr>
+          <a:xfrm>
+            <a:off x="6096000" y="1028700"/>
+            <a:ext cx="0" cy="5829300"/>
+          </a:xfrm>
+          <a:prstGeom prst="line">
+            <a:avLst/>
+          </a:prstGeom>
+          <a:ln w="139700">
+            <a:miter lim="800000"/>
+            <a:headEnd type="none"/>
+            <a:tailEnd type="none"/>
+          </a:ln>
+        </p:spPr>
+        <p:style>
+          <a:lnRef idx="1">
+            <a:schemeClr val="dk1"/>
+          </a:lnRef>
+          <a:fillRef idx="0">
+            <a:schemeClr val="dk1"/>
+          </a:fillRef>
+          <a:effectRef idx="0">
+            <a:schemeClr val="dk1"/>
+          </a:effectRef>
+          <a:fontRef idx="minor">
+            <a:schemeClr val="tx1"/>
+          </a:fontRef>
+        </p:style>
+      </p:cxnSp>
     </p:spTree>
     <p:extLst>
       <p:ext uri="{BB962C8B-B14F-4D97-AF65-F5344CB8AC3E}">
@@ -38735,48 +39132,44 @@
             <a:spLocks noGrp="1"/>
           </p:cNvSpPr>
           <p:nvPr>
-            <p:ph type="title"/>
+            <p:ph type="title" idx="4294967295"/>
           </p:nvPr>
         </p:nvSpPr>
-        <p:spPr/>
+        <p:spPr>
+          <a:xfrm>
+            <a:off x="0" y="228600"/>
+            <a:ext cx="12192000" cy="1371600"/>
+          </a:xfrm>
+        </p:spPr>
         <p:txBody>
-          <a:bodyPr/>
-          <a:lstStyle/>
-          <a:p>
-            <a:r>
-              <a:rPr lang="en-US" dirty="0" smtClean="0"/>
-              <a:t>Team Challenge</a:t>
-            </a:r>
-            <a:endParaRPr lang="en-US" dirty="0"/>
-          </a:p>
-        </p:txBody>
-      </p:sp>
-      <p:sp>
-        <p:nvSpPr>
-          <p:cNvPr id="3" name="Content Placeholder 2"/>
-          <p:cNvSpPr>
-            <a:spLocks noGrp="1"/>
-          </p:cNvSpPr>
-          <p:nvPr>
-            <p:ph idx="1"/>
-          </p:nvPr>
-        </p:nvSpPr>
-        <p:spPr/>
-        <p:txBody>
-          <a:bodyPr anchor="ctr">
+          <a:bodyPr>
             <a:normAutofit/>
           </a:bodyPr>
           <a:lstStyle/>
           <a:p>
-            <a:pPr marL="0" indent="0" algn="ctr">
-              <a:buNone/>
-            </a:pPr>
+            <a:pPr algn="ctr"/>
             <a:r>
-              <a:rPr lang="en-US" sz="5400" dirty="0"/>
+              <a:rPr lang="en-US" dirty="0" smtClean="0">
+                <a:solidFill>
+                  <a:schemeClr val="accent2"/>
+                </a:solidFill>
+              </a:rPr>
+              <a:t>Team </a:t>
+            </a:r>
+            <a:r>
+              <a:rPr lang="en-US" dirty="0" smtClean="0">
+                <a:solidFill>
+                  <a:schemeClr val="accent2"/>
+                </a:solidFill>
+              </a:rPr>
+              <a:t>Challenge: </a:t>
+            </a:r>
+            <a:r>
+              <a:rPr lang="en-US" dirty="0"/>
               <a:t>Create a CSS ruleset that will change the background color of an element with a </a:t>
             </a:r>
             <a:r>
-              <a:rPr lang="en-US" sz="5400" dirty="0">
+              <a:rPr lang="en-US" dirty="0">
                 <a:solidFill>
                   <a:schemeClr val="accent1"/>
                 </a:solidFill>
@@ -38785,11 +39178,11 @@
               <a:t>class</a:t>
             </a:r>
             <a:r>
-              <a:rPr lang="en-US" sz="5400" dirty="0"/>
+              <a:rPr lang="en-US" dirty="0"/>
               <a:t> of "box" to </a:t>
             </a:r>
             <a:r>
-              <a:rPr lang="en-US" sz="5400" dirty="0" err="1">
+              <a:rPr lang="en-US" dirty="0" err="1">
                 <a:solidFill>
                   <a:srgbClr val="FFA07A"/>
                 </a:solidFill>
@@ -38797,12 +39190,52 @@
               <a:t>lightsalmon</a:t>
             </a:r>
             <a:r>
-              <a:rPr lang="en-US" sz="5400" dirty="0"/>
-              <a:t> when it is clicked</a:t>
+              <a:rPr lang="en-US" dirty="0"/>
+              <a:t> when it is </a:t>
             </a:r>
+            <a:r>
+              <a:rPr lang="en-US" dirty="0" smtClean="0"/>
+              <a:t>clicked</a:t>
+            </a:r>
+            <a:endParaRPr lang="en-US" dirty="0"/>
           </a:p>
         </p:txBody>
       </p:sp>
+      <p:cxnSp>
+        <p:nvCxnSpPr>
+          <p:cNvPr id="4" name="Straight Connector 3"/>
+          <p:cNvCxnSpPr/>
+          <p:nvPr/>
+        </p:nvCxnSpPr>
+        <p:spPr>
+          <a:xfrm>
+            <a:off x="6096000" y="1600200"/>
+            <a:ext cx="0" cy="5257800"/>
+          </a:xfrm>
+          <a:prstGeom prst="line">
+            <a:avLst/>
+          </a:prstGeom>
+          <a:ln w="139700">
+            <a:miter lim="800000"/>
+            <a:headEnd type="none"/>
+            <a:tailEnd type="none"/>
+          </a:ln>
+        </p:spPr>
+        <p:style>
+          <a:lnRef idx="1">
+            <a:schemeClr val="dk1"/>
+          </a:lnRef>
+          <a:fillRef idx="0">
+            <a:schemeClr val="dk1"/>
+          </a:fillRef>
+          <a:effectRef idx="0">
+            <a:schemeClr val="dk1"/>
+          </a:effectRef>
+          <a:fontRef idx="minor">
+            <a:schemeClr val="tx1"/>
+          </a:fontRef>
+        </p:style>
+      </p:cxnSp>
     </p:spTree>
     <p:extLst>
       <p:ext uri="{BB962C8B-B14F-4D97-AF65-F5344CB8AC3E}">
@@ -38848,41 +39281,21 @@
         </p:nvSpPr>
         <p:spPr/>
         <p:txBody>
-          <a:bodyPr/>
+          <a:bodyPr>
+            <a:normAutofit fontScale="90000"/>
+          </a:bodyPr>
           <a:lstStyle/>
           <a:p>
             <a:r>
               <a:rPr lang="en-US" dirty="0" smtClean="0"/>
-              <a:t>Tie-breaker</a:t>
+              <a:t>Tie-breaker: </a:t>
             </a:r>
-            <a:endParaRPr lang="en-US" dirty="0"/>
-          </a:p>
-        </p:txBody>
-      </p:sp>
-      <p:sp>
-        <p:nvSpPr>
-          <p:cNvPr id="3" name="Content Placeholder 2"/>
-          <p:cNvSpPr>
-            <a:spLocks noGrp="1"/>
-          </p:cNvSpPr>
-          <p:nvPr>
-            <p:ph idx="1"/>
-          </p:nvPr>
-        </p:nvSpPr>
-        <p:spPr/>
-        <p:txBody>
-          <a:bodyPr anchor="ctr"/>
-          <a:lstStyle/>
-          <a:p>
-            <a:pPr marL="57150" indent="0" algn="ctr">
-              <a:buNone/>
-            </a:pPr>
             <a:r>
-              <a:rPr lang="en-US" sz="5400" dirty="0"/>
+              <a:rPr lang="en-US" dirty="0"/>
               <a:t>Create an HTML </a:t>
             </a:r>
             <a:r>
-              <a:rPr lang="en-US" sz="5400" dirty="0">
+              <a:rPr lang="en-US" cap="none" dirty="0" smtClean="0">
                 <a:solidFill>
                   <a:schemeClr val="accent1"/>
                 </a:solidFill>
@@ -38891,18 +39304,56 @@
               <a:t>div</a:t>
             </a:r>
             <a:r>
-              <a:rPr lang="en-US" sz="5400" dirty="0"/>
-              <a:t> that contains three columns, each of equal width</a:t>
+              <a:rPr lang="en-US" dirty="0" smtClean="0"/>
+              <a:t> </a:t>
             </a:r>
-          </a:p>
-          <a:p>
-            <a:pPr marL="57150" indent="0">
-              <a:buNone/>
-            </a:pPr>
+            <a:r>
+              <a:rPr lang="en-US" dirty="0"/>
+              <a:t>that contains three columns, each of equal </a:t>
+            </a:r>
+            <a:r>
+              <a:rPr lang="en-US" dirty="0" smtClean="0"/>
+              <a:t>width</a:t>
+            </a:r>
             <a:endParaRPr lang="en-US" dirty="0"/>
           </a:p>
         </p:txBody>
       </p:sp>
+      <p:cxnSp>
+        <p:nvCxnSpPr>
+          <p:cNvPr id="5" name="Straight Connector 4"/>
+          <p:cNvCxnSpPr/>
+          <p:nvPr/>
+        </p:nvCxnSpPr>
+        <p:spPr>
+          <a:xfrm>
+            <a:off x="6096000" y="1028700"/>
+            <a:ext cx="0" cy="5829300"/>
+          </a:xfrm>
+          <a:prstGeom prst="line">
+            <a:avLst/>
+          </a:prstGeom>
+          <a:ln w="139700">
+            <a:miter lim="800000"/>
+            <a:headEnd type="none"/>
+            <a:tailEnd type="none"/>
+          </a:ln>
+        </p:spPr>
+        <p:style>
+          <a:lnRef idx="1">
+            <a:schemeClr val="dk1"/>
+          </a:lnRef>
+          <a:fillRef idx="0">
+            <a:schemeClr val="dk1"/>
+          </a:fillRef>
+          <a:effectRef idx="0">
+            <a:schemeClr val="dk1"/>
+          </a:effectRef>
+          <a:fontRef idx="minor">
+            <a:schemeClr val="tx1"/>
+          </a:fontRef>
+        </p:style>
+      </p:cxnSp>
     </p:spTree>
     <p:extLst>
       <p:ext uri="{BB962C8B-B14F-4D97-AF65-F5344CB8AC3E}">
@@ -38946,12 +39397,7 @@
             <p:ph type="title"/>
           </p:nvPr>
         </p:nvSpPr>
-        <p:spPr>
-          <a:xfrm>
-            <a:off x="609600" y="3073518"/>
-            <a:ext cx="10972800" cy="710964"/>
-          </a:xfrm>
-        </p:spPr>
+        <p:spPr/>
         <p:txBody>
           <a:bodyPr/>
           <a:lstStyle/>
@@ -38964,6 +39410,41 @@
           </a:p>
         </p:txBody>
       </p:sp>
+      <p:cxnSp>
+        <p:nvCxnSpPr>
+          <p:cNvPr id="4" name="Straight Connector 3"/>
+          <p:cNvCxnSpPr/>
+          <p:nvPr/>
+        </p:nvCxnSpPr>
+        <p:spPr>
+          <a:xfrm>
+            <a:off x="6096000" y="1028700"/>
+            <a:ext cx="0" cy="5829300"/>
+          </a:xfrm>
+          <a:prstGeom prst="line">
+            <a:avLst/>
+          </a:prstGeom>
+          <a:ln w="139700">
+            <a:miter lim="800000"/>
+            <a:headEnd type="none"/>
+            <a:tailEnd type="none"/>
+          </a:ln>
+        </p:spPr>
+        <p:style>
+          <a:lnRef idx="1">
+            <a:schemeClr val="dk1"/>
+          </a:lnRef>
+          <a:fillRef idx="0">
+            <a:schemeClr val="dk1"/>
+          </a:fillRef>
+          <a:effectRef idx="0">
+            <a:schemeClr val="dk1"/>
+          </a:effectRef>
+          <a:fontRef idx="minor">
+            <a:schemeClr val="tx1"/>
+          </a:fontRef>
+        </p:style>
+      </p:cxnSp>
     </p:spTree>
     <p:extLst>
       <p:ext uri="{BB962C8B-B14F-4D97-AF65-F5344CB8AC3E}">
@@ -39007,14 +39488,11 @@
             <p:ph type="title"/>
           </p:nvPr>
         </p:nvSpPr>
-        <p:spPr>
-          <a:xfrm>
-            <a:off x="609600" y="2242522"/>
-            <a:ext cx="10972800" cy="2372957"/>
-          </a:xfrm>
-        </p:spPr>
+        <p:spPr/>
         <p:txBody>
-          <a:bodyPr/>
+          <a:bodyPr>
+            <a:normAutofit fontScale="90000"/>
+          </a:bodyPr>
           <a:lstStyle/>
           <a:p>
             <a:r>
@@ -39022,11 +39500,10 @@
               <a:t>What is the relationship between a </a:t>
             </a:r>
             <a:r>
-              <a:rPr lang="en-US" sz="6000" cap="none" dirty="0" err="1" smtClean="0">
+              <a:rPr lang="en-US" sz="4400" cap="none" dirty="0" err="1" smtClean="0">
                 <a:solidFill>
                   <a:schemeClr val="accent1">
-                    <a:lumMod val="40000"/>
-                    <a:lumOff val="60000"/>
+                    <a:lumMod val="50000"/>
                   </a:schemeClr>
                 </a:solidFill>
                 <a:latin typeface="Consolas" panose="020B0609020204030204" pitchFamily="49" charset="0"/>
@@ -39038,15 +39515,18 @@
               <a:t> </a:t>
             </a:r>
             <a:r>
-              <a:rPr lang="en-US" dirty="0"/>
-              <a:t>element and an </a:t>
+              <a:rPr lang="en-US" dirty="0" smtClean="0"/>
+              <a:t>and </a:t>
             </a:r>
             <a:r>
-              <a:rPr lang="en-US" sz="6000" cap="none" dirty="0" smtClean="0">
+              <a:rPr lang="en-US" dirty="0"/>
+              <a:t>an </a:t>
+            </a:r>
+            <a:r>
+              <a:rPr lang="en-US" sz="4400" cap="none" dirty="0" smtClean="0">
                 <a:solidFill>
                   <a:schemeClr val="accent1">
-                    <a:lumMod val="40000"/>
-                    <a:lumOff val="60000"/>
+                    <a:lumMod val="50000"/>
                   </a:schemeClr>
                 </a:solidFill>
                 <a:latin typeface="Consolas" panose="020B0609020204030204" pitchFamily="49" charset="0"/>
@@ -39055,15 +39535,47 @@
             </a:r>
             <a:r>
               <a:rPr lang="en-US" dirty="0" smtClean="0"/>
-              <a:t> </a:t>
+              <a:t>?</a:t>
             </a:r>
-            <a:r>
-              <a:rPr lang="en-US" dirty="0"/>
-              <a:t>element?</a:t>
-            </a:r>
+            <a:endParaRPr lang="en-US" dirty="0"/>
           </a:p>
         </p:txBody>
       </p:sp>
+      <p:cxnSp>
+        <p:nvCxnSpPr>
+          <p:cNvPr id="4" name="Straight Connector 3"/>
+          <p:cNvCxnSpPr/>
+          <p:nvPr/>
+        </p:nvCxnSpPr>
+        <p:spPr>
+          <a:xfrm>
+            <a:off x="6096000" y="1028700"/>
+            <a:ext cx="0" cy="5829300"/>
+          </a:xfrm>
+          <a:prstGeom prst="line">
+            <a:avLst/>
+          </a:prstGeom>
+          <a:ln w="139700">
+            <a:miter lim="800000"/>
+            <a:headEnd type="none"/>
+            <a:tailEnd type="none"/>
+          </a:ln>
+        </p:spPr>
+        <p:style>
+          <a:lnRef idx="1">
+            <a:schemeClr val="dk1"/>
+          </a:lnRef>
+          <a:fillRef idx="0">
+            <a:schemeClr val="dk1"/>
+          </a:fillRef>
+          <a:effectRef idx="0">
+            <a:schemeClr val="dk1"/>
+          </a:effectRef>
+          <a:fontRef idx="minor">
+            <a:schemeClr val="tx1"/>
+          </a:fontRef>
+        </p:style>
+      </p:cxnSp>
     </p:spTree>
     <p:extLst>
       <p:ext uri="{BB962C8B-B14F-4D97-AF65-F5344CB8AC3E}">
@@ -39109,45 +39621,78 @@
         </p:nvSpPr>
         <p:spPr/>
         <p:txBody>
-          <a:bodyPr/>
+          <a:bodyPr>
+            <a:normAutofit fontScale="90000"/>
+          </a:bodyPr>
           <a:lstStyle/>
           <a:p>
             <a:r>
+              <a:rPr lang="en-US" dirty="0" smtClean="0">
+                <a:solidFill>
+                  <a:schemeClr val="accent2"/>
+                </a:solidFill>
+              </a:rPr>
+              <a:t>Team </a:t>
+            </a:r>
+            <a:r>
+              <a:rPr lang="en-US" dirty="0" smtClean="0">
+                <a:solidFill>
+                  <a:schemeClr val="accent2"/>
+                </a:solidFill>
+              </a:rPr>
+              <a:t>Challenge</a:t>
+            </a:r>
+            <a:r>
               <a:rPr lang="en-US" dirty="0" smtClean="0"/>
-              <a:t>Team Challenge</a:t>
+              <a:t>: </a:t>
+            </a:r>
+            <a:r>
+              <a:rPr lang="en-US" dirty="0"/>
+              <a:t>What elements are used when creating an HTML table</a:t>
+            </a:r>
+            <a:r>
+              <a:rPr lang="en-US" dirty="0" smtClean="0"/>
+              <a:t>?</a:t>
             </a:r>
             <a:endParaRPr lang="en-US" dirty="0"/>
           </a:p>
         </p:txBody>
       </p:sp>
-      <p:sp>
-        <p:nvSpPr>
-          <p:cNvPr id="3" name="Content Placeholder 2"/>
-          <p:cNvSpPr>
-            <a:spLocks noGrp="1"/>
-          </p:cNvSpPr>
-          <p:nvPr>
-            <p:ph idx="1"/>
-          </p:nvPr>
-        </p:nvSpPr>
-        <p:spPr/>
-        <p:txBody>
-          <a:bodyPr anchor="ctr">
-            <a:normAutofit/>
-          </a:bodyPr>
-          <a:lstStyle/>
-          <a:p>
-            <a:pPr marL="57150" indent="0" algn="ctr">
-              <a:buNone/>
-            </a:pPr>
-            <a:r>
-              <a:rPr lang="en-US" sz="6000" dirty="0" smtClean="0"/>
-              <a:t>What elements are used when creating an HTML table?</a:t>
-            </a:r>
-            <a:endParaRPr lang="en-US" sz="6000" dirty="0"/>
-          </a:p>
-        </p:txBody>
-      </p:sp>
+      <p:cxnSp>
+        <p:nvCxnSpPr>
+          <p:cNvPr id="6" name="Straight Connector 5"/>
+          <p:cNvCxnSpPr/>
+          <p:nvPr/>
+        </p:nvCxnSpPr>
+        <p:spPr>
+          <a:xfrm>
+            <a:off x="6096000" y="1028700"/>
+            <a:ext cx="0" cy="5829300"/>
+          </a:xfrm>
+          <a:prstGeom prst="line">
+            <a:avLst/>
+          </a:prstGeom>
+          <a:ln w="139700">
+            <a:miter lim="800000"/>
+            <a:headEnd type="none"/>
+            <a:tailEnd type="none"/>
+          </a:ln>
+        </p:spPr>
+        <p:style>
+          <a:lnRef idx="1">
+            <a:schemeClr val="dk1"/>
+          </a:lnRef>
+          <a:fillRef idx="0">
+            <a:schemeClr val="dk1"/>
+          </a:fillRef>
+          <a:effectRef idx="0">
+            <a:schemeClr val="dk1"/>
+          </a:effectRef>
+          <a:fontRef idx="minor">
+            <a:schemeClr val="tx1"/>
+          </a:fontRef>
+        </p:style>
+      </p:cxnSp>
     </p:spTree>
     <p:extLst>
       <p:ext uri="{BB962C8B-B14F-4D97-AF65-F5344CB8AC3E}">
@@ -39191,14 +39736,11 @@
             <p:ph type="title"/>
           </p:nvPr>
         </p:nvSpPr>
-        <p:spPr>
-          <a:xfrm>
-            <a:off x="609600" y="2741120"/>
-            <a:ext cx="10972800" cy="1375761"/>
-          </a:xfrm>
-        </p:spPr>
+        <p:spPr/>
         <p:txBody>
-          <a:bodyPr/>
+          <a:bodyPr>
+            <a:normAutofit/>
+          </a:bodyPr>
           <a:lstStyle/>
           <a:p>
             <a:r>
@@ -39211,12 +39753,55 @@
             </a:r>
             <a:r>
               <a:rPr lang="en-US" dirty="0" smtClean="0"/>
-              <a:t> selector will style all paragraph elements?</a:t>
+              <a:t> selector will style all </a:t>
+            </a:r>
+            <a:r>
+              <a:rPr lang="en-US" dirty="0" smtClean="0"/>
+              <a:t>paragraphs</a:t>
+            </a:r>
+            <a:r>
+              <a:rPr lang="en-US" dirty="0" smtClean="0"/>
+              <a:t>?</a:t>
             </a:r>
             <a:endParaRPr lang="en-US" dirty="0"/>
           </a:p>
         </p:txBody>
       </p:sp>
+      <p:cxnSp>
+        <p:nvCxnSpPr>
+          <p:cNvPr id="4" name="Straight Connector 3"/>
+          <p:cNvCxnSpPr/>
+          <p:nvPr/>
+        </p:nvCxnSpPr>
+        <p:spPr>
+          <a:xfrm>
+            <a:off x="6096000" y="1028700"/>
+            <a:ext cx="0" cy="5829300"/>
+          </a:xfrm>
+          <a:prstGeom prst="line">
+            <a:avLst/>
+          </a:prstGeom>
+          <a:ln w="139700">
+            <a:miter lim="800000"/>
+            <a:headEnd type="none"/>
+            <a:tailEnd type="none"/>
+          </a:ln>
+        </p:spPr>
+        <p:style>
+          <a:lnRef idx="1">
+            <a:schemeClr val="dk1"/>
+          </a:lnRef>
+          <a:fillRef idx="0">
+            <a:schemeClr val="dk1"/>
+          </a:fillRef>
+          <a:effectRef idx="0">
+            <a:schemeClr val="dk1"/>
+          </a:effectRef>
+          <a:fontRef idx="minor">
+            <a:schemeClr val="tx1"/>
+          </a:fontRef>
+        </p:style>
+      </p:cxnSp>
     </p:spTree>
     <p:extLst>
       <p:ext uri="{BB962C8B-B14F-4D97-AF65-F5344CB8AC3E}">
@@ -39260,14 +39845,11 @@
             <p:ph type="title"/>
           </p:nvPr>
         </p:nvSpPr>
-        <p:spPr>
-          <a:xfrm>
-            <a:off x="609600" y="2741120"/>
-            <a:ext cx="10972800" cy="1375761"/>
-          </a:xfrm>
-        </p:spPr>
+        <p:spPr/>
         <p:txBody>
-          <a:bodyPr/>
+          <a:bodyPr>
+            <a:normAutofit fontScale="90000"/>
+          </a:bodyPr>
           <a:lstStyle/>
           <a:p>
             <a:r>
@@ -39278,8 +39860,7 @@
               <a:rPr lang="en-US" cap="none" dirty="0" smtClean="0">
                 <a:solidFill>
                   <a:schemeClr val="accent1">
-                    <a:lumMod val="40000"/>
-                    <a:lumOff val="60000"/>
+                    <a:lumMod val="50000"/>
                   </a:schemeClr>
                 </a:solidFill>
               </a:rPr>
@@ -39297,6 +39878,41 @@
           </a:p>
         </p:txBody>
       </p:sp>
+      <p:cxnSp>
+        <p:nvCxnSpPr>
+          <p:cNvPr id="4" name="Straight Connector 3"/>
+          <p:cNvCxnSpPr/>
+          <p:nvPr/>
+        </p:nvCxnSpPr>
+        <p:spPr>
+          <a:xfrm>
+            <a:off x="6096000" y="1028700"/>
+            <a:ext cx="0" cy="5829300"/>
+          </a:xfrm>
+          <a:prstGeom prst="line">
+            <a:avLst/>
+          </a:prstGeom>
+          <a:ln w="139700">
+            <a:miter lim="800000"/>
+            <a:headEnd type="none"/>
+            <a:tailEnd type="none"/>
+          </a:ln>
+        </p:spPr>
+        <p:style>
+          <a:lnRef idx="1">
+            <a:schemeClr val="dk1"/>
+          </a:lnRef>
+          <a:fillRef idx="0">
+            <a:schemeClr val="dk1"/>
+          </a:fillRef>
+          <a:effectRef idx="0">
+            <a:schemeClr val="dk1"/>
+          </a:effectRef>
+          <a:fontRef idx="minor">
+            <a:schemeClr val="tx1"/>
+          </a:fontRef>
+        </p:style>
+      </p:cxnSp>
     </p:spTree>
     <p:extLst>
       <p:ext uri="{BB962C8B-B14F-4D97-AF65-F5344CB8AC3E}">
@@ -39340,12 +39956,7 @@
             <p:ph type="title"/>
           </p:nvPr>
         </p:nvSpPr>
-        <p:spPr>
-          <a:xfrm>
-            <a:off x="609600" y="2741120"/>
-            <a:ext cx="10972800" cy="1375761"/>
-          </a:xfrm>
-        </p:spPr>
+        <p:spPr/>
         <p:txBody>
           <a:bodyPr/>
           <a:lstStyle/>
@@ -39358,6 +39969,41 @@
           </a:p>
         </p:txBody>
       </p:sp>
+      <p:cxnSp>
+        <p:nvCxnSpPr>
+          <p:cNvPr id="4" name="Straight Connector 3"/>
+          <p:cNvCxnSpPr/>
+          <p:nvPr/>
+        </p:nvCxnSpPr>
+        <p:spPr>
+          <a:xfrm>
+            <a:off x="6096000" y="1028700"/>
+            <a:ext cx="0" cy="5829300"/>
+          </a:xfrm>
+          <a:prstGeom prst="line">
+            <a:avLst/>
+          </a:prstGeom>
+          <a:ln w="139700">
+            <a:miter lim="800000"/>
+            <a:headEnd type="none"/>
+            <a:tailEnd type="none"/>
+          </a:ln>
+        </p:spPr>
+        <p:style>
+          <a:lnRef idx="1">
+            <a:schemeClr val="dk1"/>
+          </a:lnRef>
+          <a:fillRef idx="0">
+            <a:schemeClr val="dk1"/>
+          </a:fillRef>
+          <a:effectRef idx="0">
+            <a:schemeClr val="dk1"/>
+          </a:effectRef>
+          <a:fontRef idx="minor">
+            <a:schemeClr val="tx1"/>
+          </a:fontRef>
+        </p:style>
+      </p:cxnSp>
     </p:spTree>
     <p:extLst>
       <p:ext uri="{BB962C8B-B14F-4D97-AF65-F5344CB8AC3E}">
@@ -39401,14 +40047,11 @@
             <p:ph type="title"/>
           </p:nvPr>
         </p:nvSpPr>
-        <p:spPr>
-          <a:xfrm>
-            <a:off x="609600" y="2076321"/>
-            <a:ext cx="10972800" cy="2705356"/>
-          </a:xfrm>
-        </p:spPr>
+        <p:spPr/>
         <p:txBody>
-          <a:bodyPr/>
+          <a:bodyPr>
+            <a:normAutofit fontScale="90000"/>
+          </a:bodyPr>
           <a:lstStyle/>
           <a:p>
             <a:r>
@@ -39427,6 +40070,41 @@
           </a:p>
         </p:txBody>
       </p:sp>
+      <p:cxnSp>
+        <p:nvCxnSpPr>
+          <p:cNvPr id="4" name="Straight Connector 3"/>
+          <p:cNvCxnSpPr/>
+          <p:nvPr/>
+        </p:nvCxnSpPr>
+        <p:spPr>
+          <a:xfrm>
+            <a:off x="6096000" y="1028700"/>
+            <a:ext cx="0" cy="5829300"/>
+          </a:xfrm>
+          <a:prstGeom prst="line">
+            <a:avLst/>
+          </a:prstGeom>
+          <a:ln w="139700">
+            <a:miter lim="800000"/>
+            <a:headEnd type="none"/>
+            <a:tailEnd type="none"/>
+          </a:ln>
+        </p:spPr>
+        <p:style>
+          <a:lnRef idx="1">
+            <a:schemeClr val="dk1"/>
+          </a:lnRef>
+          <a:fillRef idx="0">
+            <a:schemeClr val="dk1"/>
+          </a:fillRef>
+          <a:effectRef idx="0">
+            <a:schemeClr val="dk1"/>
+          </a:effectRef>
+          <a:fontRef idx="minor">
+            <a:schemeClr val="tx1"/>
+          </a:fontRef>
+        </p:style>
+      </p:cxnSp>
     </p:spTree>
     <p:extLst>
       <p:ext uri="{BB962C8B-B14F-4D97-AF65-F5344CB8AC3E}">

</xml_diff>